<commit_message>
first two projects added
</commit_message>
<xml_diff>
--- a/logos.pptx
+++ b/logos.pptx
@@ -5,12 +5,12 @@
     <p:sldMasterId id="2147483672" r:id="rId1"/>
   </p:sldMasterIdLst>
   <p:sldIdLst>
-    <p:sldId id="256" r:id="rId2"/>
-    <p:sldId id="257" r:id="rId3"/>
-    <p:sldId id="258" r:id="rId4"/>
-    <p:sldId id="259" r:id="rId5"/>
+    <p:sldId id="258" r:id="rId2"/>
+    <p:sldId id="256" r:id="rId3"/>
+    <p:sldId id="257" r:id="rId4"/>
+    <p:sldId id="261" r:id="rId5"/>
     <p:sldId id="260" r:id="rId6"/>
-    <p:sldId id="261" r:id="rId7"/>
+    <p:sldId id="259" r:id="rId7"/>
   </p:sldIdLst>
   <p:sldSz cx="7199313" cy="3600450"/>
   <p:notesSz cx="6858000" cy="9144000"/>
@@ -2959,6 +2959,67 @@
 <file path=ppt/slides/slide1.xml><?xml version="1.0" encoding="utf-8"?>
 <p:sld xmlns:a="http://schemas.openxmlformats.org/drawingml/2006/main" xmlns:r="http://schemas.openxmlformats.org/officeDocument/2006/relationships" xmlns:p="http://schemas.openxmlformats.org/presentationml/2006/main">
   <p:cSld>
+    <p:bg>
+      <p:bgPr>
+        <a:solidFill>
+          <a:srgbClr val="325D88"/>
+        </a:solidFill>
+        <a:effectLst/>
+      </p:bgPr>
+    </p:bg>
+    <p:spTree>
+      <p:nvGrpSpPr>
+        <p:cNvPr id="1" name=""/>
+        <p:cNvGrpSpPr/>
+        <p:nvPr/>
+      </p:nvGrpSpPr>
+      <p:grpSpPr>
+        <a:xfrm>
+          <a:off x="0" y="0"/>
+          <a:ext cx="0" cy="0"/>
+          <a:chOff x="0" y="0"/>
+          <a:chExt cx="0" cy="0"/>
+        </a:xfrm>
+      </p:grpSpPr>
+      <p:pic>
+        <p:nvPicPr>
+          <p:cNvPr id="2" name="Kép 1"/>
+          <p:cNvPicPr>
+            <a:picLocks noChangeAspect="1"/>
+          </p:cNvPicPr>
+          <p:nvPr/>
+        </p:nvPicPr>
+        <p:blipFill rotWithShape="1">
+          <a:blip r:embed="rId2"/>
+          <a:srcRect l="14383" t="24108" r="18501" b="37351"/>
+          <a:stretch/>
+        </p:blipFill>
+        <p:spPr>
+          <a:xfrm>
+            <a:off x="308578" y="661086"/>
+            <a:ext cx="6491397" cy="2391032"/>
+          </a:xfrm>
+          <a:prstGeom prst="rect">
+            <a:avLst/>
+          </a:prstGeom>
+        </p:spPr>
+      </p:pic>
+    </p:spTree>
+    <p:extLst>
+      <p:ext uri="{BB962C8B-B14F-4D97-AF65-F5344CB8AC3E}">
+        <p14:creationId xmlns:p14="http://schemas.microsoft.com/office/powerpoint/2010/main" val="747453439"/>
+      </p:ext>
+    </p:extLst>
+  </p:cSld>
+  <p:clrMapOvr>
+    <a:masterClrMapping/>
+  </p:clrMapOvr>
+</p:sld>
+</file>
+
+<file path=ppt/slides/slide2.xml><?xml version="1.0" encoding="utf-8"?>
+<p:sld xmlns:a="http://schemas.openxmlformats.org/drawingml/2006/main" xmlns:r="http://schemas.openxmlformats.org/officeDocument/2006/relationships" xmlns:p="http://schemas.openxmlformats.org/presentationml/2006/main">
+  <p:cSld>
     <p:spTree>
       <p:nvGrpSpPr>
         <p:cNvPr id="1" name=""/>
@@ -2995,8 +3056,8 @@
         </p:blipFill>
         <p:spPr>
           <a:xfrm>
-            <a:off x="16322" y="794519"/>
-            <a:ext cx="7163640" cy="1924423"/>
+            <a:off x="495299" y="805327"/>
+            <a:ext cx="6236987" cy="1675489"/>
           </a:xfrm>
           <a:prstGeom prst="rect">
             <a:avLst/>
@@ -3016,7 +3077,7 @@
 </p:sld>
 </file>
 
-<file path=ppt/slides/slide2.xml><?xml version="1.0" encoding="utf-8"?>
+<file path=ppt/slides/slide3.xml><?xml version="1.0" encoding="utf-8"?>
 <p:sld xmlns:a="http://schemas.openxmlformats.org/drawingml/2006/main" xmlns:r="http://schemas.openxmlformats.org/officeDocument/2006/relationships" xmlns:p="http://schemas.openxmlformats.org/presentationml/2006/main">
   <p:cSld>
     <p:bg>
@@ -3083,13 +3144,13 @@
 </p:sld>
 </file>
 
-<file path=ppt/slides/slide3.xml><?xml version="1.0" encoding="utf-8"?>
+<file path=ppt/slides/slide4.xml><?xml version="1.0" encoding="utf-8"?>
 <p:sld xmlns:a="http://schemas.openxmlformats.org/drawingml/2006/main" xmlns:r="http://schemas.openxmlformats.org/officeDocument/2006/relationships" xmlns:p="http://schemas.openxmlformats.org/presentationml/2006/main">
   <p:cSld>
     <p:bg>
       <p:bgPr>
         <a:solidFill>
-          <a:srgbClr val="325D88"/>
+          <a:srgbClr val="050107"/>
         </a:solidFill>
         <a:effectLst/>
       </p:bgPr>
@@ -3110,60 +3171,7 @@
       </p:grpSpPr>
       <p:pic>
         <p:nvPicPr>
-          <p:cNvPr id="2" name="Kép 1"/>
-          <p:cNvPicPr>
-            <a:picLocks noChangeAspect="1"/>
-          </p:cNvPicPr>
-          <p:nvPr/>
-        </p:nvPicPr>
-        <p:blipFill rotWithShape="1">
-          <a:blip r:embed="rId2"/>
-          <a:srcRect l="14383" t="24108" r="18501" b="37351"/>
-          <a:stretch/>
-        </p:blipFill>
-        <p:spPr>
-          <a:xfrm>
-            <a:off x="308578" y="661086"/>
-            <a:ext cx="6491397" cy="2391032"/>
-          </a:xfrm>
-          <a:prstGeom prst="rect">
-            <a:avLst/>
-          </a:prstGeom>
-        </p:spPr>
-      </p:pic>
-    </p:spTree>
-    <p:extLst>
-      <p:ext uri="{BB962C8B-B14F-4D97-AF65-F5344CB8AC3E}">
-        <p14:creationId xmlns:p14="http://schemas.microsoft.com/office/powerpoint/2010/main" val="747453439"/>
-      </p:ext>
-    </p:extLst>
-  </p:cSld>
-  <p:clrMapOvr>
-    <a:masterClrMapping/>
-  </p:clrMapOvr>
-</p:sld>
-</file>
-
-<file path=ppt/slides/slide4.xml><?xml version="1.0" encoding="utf-8"?>
-<p:sld xmlns:a="http://schemas.openxmlformats.org/drawingml/2006/main" xmlns:r="http://schemas.openxmlformats.org/officeDocument/2006/relationships" xmlns:p="http://schemas.openxmlformats.org/presentationml/2006/main">
-  <p:cSld>
-    <p:spTree>
-      <p:nvGrpSpPr>
-        <p:cNvPr id="1" name=""/>
-        <p:cNvGrpSpPr/>
-        <p:nvPr/>
-      </p:nvGrpSpPr>
-      <p:grpSpPr>
-        <a:xfrm>
-          <a:off x="0" y="0"/>
-          <a:ext cx="0" cy="0"/>
-          <a:chOff x="0" y="0"/>
-          <a:chExt cx="0" cy="0"/>
-        </a:xfrm>
-      </p:grpSpPr>
-      <p:pic>
-        <p:nvPicPr>
-          <p:cNvPr id="2" name="Kép 1"/>
+          <p:cNvPr id="4" name="Kép 3"/>
           <p:cNvPicPr>
             <a:picLocks noChangeAspect="1"/>
           </p:cNvPicPr>
@@ -3183,8 +3191,8 @@
         </p:blipFill>
         <p:spPr>
           <a:xfrm>
-            <a:off x="1186476" y="148282"/>
-            <a:ext cx="4891263" cy="3249826"/>
+            <a:off x="902176" y="0"/>
+            <a:ext cx="5394960" cy="3600450"/>
           </a:xfrm>
           <a:prstGeom prst="rect">
             <a:avLst/>
@@ -3194,7 +3202,7 @@
     </p:spTree>
     <p:extLst>
       <p:ext uri="{BB962C8B-B14F-4D97-AF65-F5344CB8AC3E}">
-        <p14:creationId xmlns:p14="http://schemas.microsoft.com/office/powerpoint/2010/main" val="1970822395"/>
+        <p14:creationId xmlns:p14="http://schemas.microsoft.com/office/powerpoint/2010/main" val="474686773"/>
       </p:ext>
     </p:extLst>
   </p:cSld>
@@ -3260,14 +3268,6 @@
 <file path=ppt/slides/slide6.xml><?xml version="1.0" encoding="utf-8"?>
 <p:sld xmlns:a="http://schemas.openxmlformats.org/drawingml/2006/main" xmlns:r="http://schemas.openxmlformats.org/officeDocument/2006/relationships" xmlns:p="http://schemas.openxmlformats.org/presentationml/2006/main">
   <p:cSld>
-    <p:bg>
-      <p:bgPr>
-        <a:solidFill>
-          <a:srgbClr val="050107"/>
-        </a:solidFill>
-        <a:effectLst/>
-      </p:bgPr>
-    </p:bg>
     <p:spTree>
       <p:nvGrpSpPr>
         <p:cNvPr id="1" name=""/>
@@ -3284,7 +3284,7 @@
       </p:grpSpPr>
       <p:pic>
         <p:nvPicPr>
-          <p:cNvPr id="4" name="Kép 3"/>
+          <p:cNvPr id="2" name="Kép 1"/>
           <p:cNvPicPr>
             <a:picLocks noChangeAspect="1"/>
           </p:cNvPicPr>
@@ -3304,8 +3304,8 @@
         </p:blipFill>
         <p:spPr>
           <a:xfrm>
-            <a:off x="902176" y="0"/>
-            <a:ext cx="5394960" cy="3600450"/>
+            <a:off x="1186476" y="148282"/>
+            <a:ext cx="4891263" cy="3249826"/>
           </a:xfrm>
           <a:prstGeom prst="rect">
             <a:avLst/>
@@ -3315,7 +3315,7 @@
     </p:spTree>
     <p:extLst>
       <p:ext uri="{BB962C8B-B14F-4D97-AF65-F5344CB8AC3E}">
-        <p14:creationId xmlns:p14="http://schemas.microsoft.com/office/powerpoint/2010/main" val="474686773"/>
+        <p14:creationId xmlns:p14="http://schemas.microsoft.com/office/powerpoint/2010/main" val="1970822395"/>
       </p:ext>
     </p:extLst>
   </p:cSld>

</xml_diff>